<commit_message>
added links and printscreens
</commit_message>
<xml_diff>
--- a/Testing Project for Automation Exercise E-commerce Website.pptx
+++ b/Testing Project for Automation Exercise E-commerce Website.pptx
@@ -262,7 +262,7 @@
           <a:p>
             <a:fld id="{276D79ED-3FA7-4EF8-964B-EB8BCFAB02F8}" type="datetimeFigureOut">
               <a:rPr lang="en-US" smtClean="0"/>
-              <a:t>7/7/2024</a:t>
+              <a:t>7/8/2024</a:t>
             </a:fld>
             <a:endParaRPr lang="en-US"/>
           </a:p>
@@ -430,7 +430,7 @@
           <a:p>
             <a:fld id="{276D79ED-3FA7-4EF8-964B-EB8BCFAB02F8}" type="datetimeFigureOut">
               <a:rPr lang="en-US" smtClean="0"/>
-              <a:t>7/7/2024</a:t>
+              <a:t>7/8/2024</a:t>
             </a:fld>
             <a:endParaRPr lang="en-US"/>
           </a:p>
@@ -676,7 +676,7 @@
           <a:p>
             <a:fld id="{276D79ED-3FA7-4EF8-964B-EB8BCFAB02F8}" type="datetimeFigureOut">
               <a:rPr lang="en-US" smtClean="0"/>
-              <a:t>7/7/2024</a:t>
+              <a:t>7/8/2024</a:t>
             </a:fld>
             <a:endParaRPr lang="en-US"/>
           </a:p>
@@ -907,7 +907,7 @@
           <a:p>
             <a:fld id="{276D79ED-3FA7-4EF8-964B-EB8BCFAB02F8}" type="datetimeFigureOut">
               <a:rPr lang="en-US" smtClean="0"/>
-              <a:t>7/7/2024</a:t>
+              <a:t>7/8/2024</a:t>
             </a:fld>
             <a:endParaRPr lang="en-US"/>
           </a:p>
@@ -1271,7 +1271,7 @@
           <a:p>
             <a:fld id="{276D79ED-3FA7-4EF8-964B-EB8BCFAB02F8}" type="datetimeFigureOut">
               <a:rPr lang="en-US" smtClean="0"/>
-              <a:t>7/7/2024</a:t>
+              <a:t>7/8/2024</a:t>
             </a:fld>
             <a:endParaRPr lang="en-US"/>
           </a:p>
@@ -1388,7 +1388,7 @@
           <a:p>
             <a:fld id="{276D79ED-3FA7-4EF8-964B-EB8BCFAB02F8}" type="datetimeFigureOut">
               <a:rPr lang="en-US" smtClean="0"/>
-              <a:t>7/7/2024</a:t>
+              <a:t>7/8/2024</a:t>
             </a:fld>
             <a:endParaRPr lang="en-US"/>
           </a:p>
@@ -1483,7 +1483,7 @@
           <a:p>
             <a:fld id="{276D79ED-3FA7-4EF8-964B-EB8BCFAB02F8}" type="datetimeFigureOut">
               <a:rPr lang="en-US" smtClean="0"/>
-              <a:t>7/7/2024</a:t>
+              <a:t>7/8/2024</a:t>
             </a:fld>
             <a:endParaRPr lang="en-US"/>
           </a:p>
@@ -1759,7 +1759,7 @@
           <a:p>
             <a:fld id="{276D79ED-3FA7-4EF8-964B-EB8BCFAB02F8}" type="datetimeFigureOut">
               <a:rPr lang="en-US" smtClean="0"/>
-              <a:t>7/7/2024</a:t>
+              <a:t>7/8/2024</a:t>
             </a:fld>
             <a:endParaRPr lang="en-US"/>
           </a:p>
@@ -2015,7 +2015,7 @@
           <a:p>
             <a:fld id="{276D79ED-3FA7-4EF8-964B-EB8BCFAB02F8}" type="datetimeFigureOut">
               <a:rPr lang="en-US" smtClean="0"/>
-              <a:t>7/7/2024</a:t>
+              <a:t>7/8/2024</a:t>
             </a:fld>
             <a:endParaRPr lang="en-US"/>
           </a:p>
@@ -2235,7 +2235,7 @@
           <a:p>
             <a:fld id="{276D79ED-3FA7-4EF8-964B-EB8BCFAB02F8}" type="datetimeFigureOut">
               <a:rPr lang="en-US" smtClean="0"/>
-              <a:t>7/7/2024</a:t>
+              <a:t>7/8/2024</a:t>
             </a:fld>
             <a:endParaRPr lang="en-US"/>
           </a:p>
@@ -4018,7 +4018,7 @@
             </a:endParaRPr>
           </a:p>
           <a:p>
-            <a:pPr marL="342900" lvl="0" indent="-342900">
+            <a:pPr marL="800100" lvl="1" indent="-342900">
               <a:lnSpc>
                 <a:spcPct val="107000"/>
               </a:lnSpc>
@@ -4042,7 +4042,7 @@
             </a:endParaRPr>
           </a:p>
           <a:p>
-            <a:pPr marL="342900" lvl="0" indent="-342900">
+            <a:pPr marL="800100" lvl="1" indent="-342900">
               <a:lnSpc>
                 <a:spcPct val="107000"/>
               </a:lnSpc>
@@ -4066,7 +4066,7 @@
             </a:endParaRPr>
           </a:p>
           <a:p>
-            <a:pPr marL="342900" lvl="0" indent="-342900">
+            <a:pPr marL="800100" lvl="1" indent="-342900">
               <a:lnSpc>
                 <a:spcPct val="107000"/>
               </a:lnSpc>
@@ -4090,7 +4090,7 @@
             </a:endParaRPr>
           </a:p>
           <a:p>
-            <a:pPr marL="342900" lvl="0" indent="-342900">
+            <a:pPr marL="800100" lvl="1" indent="-342900">
               <a:lnSpc>
                 <a:spcPct val="107000"/>
               </a:lnSpc>
@@ -4119,22 +4119,47 @@
               <a:t> &amp; </a:t>
             </a:r>
             <a:r>
-              <a:rPr lang="ro-RO" sz="1200" noProof="1">
-                <a:effectLst/>
+              <a:rPr lang="en-US" sz="1200" noProof="1">
                 <a:latin typeface="Calibri" panose="020F0502020204030204" pitchFamily="34" charset="0"/>
                 <a:ea typeface="Calibri" panose="020F0502020204030204" pitchFamily="34" charset="0"/>
                 <a:cs typeface="Times New Roman" panose="02020603050405020304" pitchFamily="18" charset="0"/>
               </a:rPr>
-              <a:t>account</a:t>
-            </a:r>
-            <a:r>
-              <a:rPr lang="ro-RO" sz="1200" dirty="0">
+              <a:t>A</a:t>
+            </a:r>
+            <a:r>
+              <a:rPr lang="ro-RO" sz="1200" noProof="1">
                 <a:effectLst/>
                 <a:latin typeface="Calibri" panose="020F0502020204030204" pitchFamily="34" charset="0"/>
                 <a:ea typeface="Calibri" panose="020F0502020204030204" pitchFamily="34" charset="0"/>
                 <a:cs typeface="Times New Roman" panose="02020603050405020304" pitchFamily="18" charset="0"/>
               </a:rPr>
-              <a:t> management</a:t>
+              <a:t>ccount</a:t>
+            </a:r>
+            <a:r>
+              <a:rPr lang="ro-RO" sz="1200" dirty="0">
+                <a:effectLst/>
+                <a:latin typeface="Calibri" panose="020F0502020204030204" pitchFamily="34" charset="0"/>
+                <a:ea typeface="Calibri" panose="020F0502020204030204" pitchFamily="34" charset="0"/>
+                <a:cs typeface="Times New Roman" panose="02020603050405020304" pitchFamily="18" charset="0"/>
+              </a:rPr>
+              <a:t> </a:t>
+            </a:r>
+            <a:r>
+              <a:rPr lang="en-US" sz="1200" dirty="0">
+                <a:latin typeface="Calibri" panose="020F0502020204030204" pitchFamily="34" charset="0"/>
+                <a:ea typeface="Calibri" panose="020F0502020204030204" pitchFamily="34" charset="0"/>
+                <a:cs typeface="Times New Roman" panose="02020603050405020304" pitchFamily="18" charset="0"/>
+              </a:rPr>
+              <a:t>M</a:t>
+            </a:r>
+            <a:r>
+              <a:rPr lang="ro-RO" sz="1200" noProof="1">
+                <a:effectLst/>
+                <a:latin typeface="Calibri" panose="020F0502020204030204" pitchFamily="34" charset="0"/>
+                <a:ea typeface="Calibri" panose="020F0502020204030204" pitchFamily="34" charset="0"/>
+                <a:cs typeface="Times New Roman" panose="02020603050405020304" pitchFamily="18" charset="0"/>
+              </a:rPr>
+              <a:t>anagement</a:t>
             </a:r>
           </a:p>
         </p:txBody>
@@ -4153,7 +4178,7 @@
         </p:nvSpPr>
         <p:spPr>
           <a:xfrm>
-            <a:off x="6208268" y="4870623"/>
+            <a:off x="6208267" y="4554014"/>
             <a:ext cx="3161643" cy="976678"/>
           </a:xfrm>
           <a:prstGeom prst="rect">
@@ -4233,14 +4258,51 @@
                 <a:ea typeface="Calibri" panose="020F0502020204030204" pitchFamily="34" charset="0"/>
                 <a:cs typeface="Times New Roman" panose="02020603050405020304" pitchFamily="18" charset="0"/>
               </a:rPr>
-              <a:t>Signup/Login</a:t>
-            </a:r>
-            <a:endParaRPr lang="ro-RO" sz="1200" dirty="0">
-              <a:effectLst/>
-              <a:latin typeface="Calibri" panose="020F0502020204030204" pitchFamily="34" charset="0"/>
-              <a:ea typeface="Calibri" panose="020F0502020204030204" pitchFamily="34" charset="0"/>
-              <a:cs typeface="Times New Roman" panose="02020603050405020304" pitchFamily="18" charset="0"/>
-            </a:endParaRPr>
+              <a:t>Signup/Login &amp; </a:t>
+            </a:r>
+            <a:r>
+              <a:rPr lang="en-US" sz="1200" noProof="1">
+                <a:latin typeface="Calibri" panose="020F0502020204030204" pitchFamily="34" charset="0"/>
+                <a:ea typeface="Calibri" panose="020F0502020204030204" pitchFamily="34" charset="0"/>
+                <a:cs typeface="Times New Roman" panose="02020603050405020304" pitchFamily="18" charset="0"/>
+              </a:rPr>
+              <a:t>A</a:t>
+            </a:r>
+            <a:r>
+              <a:rPr lang="ro-RO" sz="1200" noProof="1">
+                <a:effectLst/>
+                <a:latin typeface="Calibri" panose="020F0502020204030204" pitchFamily="34" charset="0"/>
+                <a:ea typeface="Calibri" panose="020F0502020204030204" pitchFamily="34" charset="0"/>
+                <a:cs typeface="Times New Roman" panose="02020603050405020304" pitchFamily="18" charset="0"/>
+              </a:rPr>
+              <a:t>ccount</a:t>
+            </a:r>
+            <a:r>
+              <a:rPr lang="ro-RO" sz="1200" dirty="0">
+                <a:effectLst/>
+                <a:latin typeface="Calibri" panose="020F0502020204030204" pitchFamily="34" charset="0"/>
+                <a:ea typeface="Calibri" panose="020F0502020204030204" pitchFamily="34" charset="0"/>
+                <a:cs typeface="Times New Roman" panose="02020603050405020304" pitchFamily="18" charset="0"/>
+              </a:rPr>
+              <a:t> </a:t>
+            </a:r>
+            <a:r>
+              <a:rPr lang="en-US" sz="1200" dirty="0">
+                <a:latin typeface="Calibri" panose="020F0502020204030204" pitchFamily="34" charset="0"/>
+                <a:ea typeface="Calibri" panose="020F0502020204030204" pitchFamily="34" charset="0"/>
+                <a:cs typeface="Times New Roman" panose="02020603050405020304" pitchFamily="18" charset="0"/>
+              </a:rPr>
+              <a:t>M</a:t>
+            </a:r>
+            <a:r>
+              <a:rPr lang="ro-RO" sz="1200" noProof="1">
+                <a:effectLst/>
+                <a:latin typeface="Calibri" panose="020F0502020204030204" pitchFamily="34" charset="0"/>
+                <a:ea typeface="Calibri" panose="020F0502020204030204" pitchFamily="34" charset="0"/>
+                <a:cs typeface="Times New Roman" panose="02020603050405020304" pitchFamily="18" charset="0"/>
+              </a:rPr>
+              <a:t>anagement</a:t>
+            </a:r>
           </a:p>
         </p:txBody>
       </p:sp>
@@ -4344,7 +4406,7 @@
         </p:blipFill>
         <p:spPr>
           <a:xfrm>
-            <a:off x="6059401" y="4885975"/>
+            <a:off x="6059401" y="4554014"/>
             <a:ext cx="196307" cy="244113"/>
           </a:xfrm>
           <a:prstGeom prst="rect">
@@ -4366,7 +4428,7 @@
         </p:nvSpPr>
         <p:spPr>
           <a:xfrm>
-            <a:off x="6198063" y="6024280"/>
+            <a:off x="6208267" y="5750221"/>
             <a:ext cx="3161643" cy="584775"/>
           </a:xfrm>
           <a:prstGeom prst="rect">
@@ -4411,9 +4473,20 @@
                 <a:latin typeface="Calibri" panose="020F0502020204030204" pitchFamily="34" charset="0"/>
                 <a:ea typeface="Calibri" panose="020F0502020204030204" pitchFamily="34" charset="0"/>
                 <a:cs typeface="Times New Roman" panose="02020603050405020304" pitchFamily="18" charset="0"/>
+                <a:hlinkClick r:id="rId5"/>
               </a:rPr>
               <a:t>AICI</a:t>
             </a:r>
+            <a:endParaRPr lang="ro-RO" sz="1600" b="1" noProof="1">
+              <a:solidFill>
+                <a:schemeClr val="accent6">
+                  <a:lumMod val="75000"/>
+                </a:schemeClr>
+              </a:solidFill>
+              <a:latin typeface="Calibri" panose="020F0502020204030204" pitchFamily="34" charset="0"/>
+              <a:ea typeface="Calibri" panose="020F0502020204030204" pitchFamily="34" charset="0"/>
+              <a:cs typeface="Times New Roman" panose="02020603050405020304" pitchFamily="18" charset="0"/>
+            </a:endParaRPr>
           </a:p>
         </p:txBody>
       </p:sp>
@@ -4445,7 +4518,7 @@
         </p:blipFill>
         <p:spPr>
           <a:xfrm>
-            <a:off x="6110114" y="6060324"/>
+            <a:off x="6110113" y="5792676"/>
             <a:ext cx="196307" cy="244113"/>
           </a:xfrm>
           <a:prstGeom prst="rect">
@@ -4676,8 +4749,12 @@
               </a:spcAft>
             </a:pPr>
             <a:r>
+              <a:rPr lang="en-US" sz="1200" b="1" dirty="0"/>
+              <a:t>Test conditions</a:t>
+            </a:r>
+            <a:r>
               <a:rPr lang="ro-RO" sz="1200" b="1" dirty="0"/>
-              <a:t>Condițiile de testare:</a:t>
+              <a:t>:</a:t>
             </a:r>
             <a:r>
               <a:rPr lang="ro-RO" sz="1200" dirty="0"/>
@@ -5107,7 +5184,7 @@
                 <a:ea typeface="Calibri" panose="020F0502020204030204" pitchFamily="34" charset="0"/>
                 <a:cs typeface="Calibri" panose="020F0502020204030204" pitchFamily="34" charset="0"/>
               </a:rPr>
-              <a:t>TraceabilityMatrix</a:t>
+              <a:t>Traceability Matrix</a:t>
             </a:r>
             <a:endParaRPr lang="en-US" sz="1050" u="sng" noProof="1">
               <a:latin typeface="Calibri" panose="020F0502020204030204" pitchFamily="34" charset="0"/>

</xml_diff>

<commit_message>
Update Testing Project for Automation Exercise E-commerce Website.pptx
</commit_message>
<xml_diff>
--- a/Testing Project for Automation Exercise E-commerce Website.pptx
+++ b/Testing Project for Automation Exercise E-commerce Website.pptx
@@ -262,7 +262,7 @@
           <a:p>
             <a:fld id="{276D79ED-3FA7-4EF8-964B-EB8BCFAB02F8}" type="datetimeFigureOut">
               <a:rPr lang="en-US" smtClean="0"/>
-              <a:t>7/18/2024</a:t>
+              <a:t>7/22/2024</a:t>
             </a:fld>
             <a:endParaRPr lang="en-US"/>
           </a:p>
@@ -430,7 +430,7 @@
           <a:p>
             <a:fld id="{276D79ED-3FA7-4EF8-964B-EB8BCFAB02F8}" type="datetimeFigureOut">
               <a:rPr lang="en-US" smtClean="0"/>
-              <a:t>7/18/2024</a:t>
+              <a:t>7/22/2024</a:t>
             </a:fld>
             <a:endParaRPr lang="en-US"/>
           </a:p>
@@ -676,7 +676,7 @@
           <a:p>
             <a:fld id="{276D79ED-3FA7-4EF8-964B-EB8BCFAB02F8}" type="datetimeFigureOut">
               <a:rPr lang="en-US" smtClean="0"/>
-              <a:t>7/18/2024</a:t>
+              <a:t>7/22/2024</a:t>
             </a:fld>
             <a:endParaRPr lang="en-US"/>
           </a:p>
@@ -907,7 +907,7 @@
           <a:p>
             <a:fld id="{276D79ED-3FA7-4EF8-964B-EB8BCFAB02F8}" type="datetimeFigureOut">
               <a:rPr lang="en-US" smtClean="0"/>
-              <a:t>7/18/2024</a:t>
+              <a:t>7/22/2024</a:t>
             </a:fld>
             <a:endParaRPr lang="en-US"/>
           </a:p>
@@ -1271,7 +1271,7 @@
           <a:p>
             <a:fld id="{276D79ED-3FA7-4EF8-964B-EB8BCFAB02F8}" type="datetimeFigureOut">
               <a:rPr lang="en-US" smtClean="0"/>
-              <a:t>7/18/2024</a:t>
+              <a:t>7/22/2024</a:t>
             </a:fld>
             <a:endParaRPr lang="en-US"/>
           </a:p>
@@ -1388,7 +1388,7 @@
           <a:p>
             <a:fld id="{276D79ED-3FA7-4EF8-964B-EB8BCFAB02F8}" type="datetimeFigureOut">
               <a:rPr lang="en-US" smtClean="0"/>
-              <a:t>7/18/2024</a:t>
+              <a:t>7/22/2024</a:t>
             </a:fld>
             <a:endParaRPr lang="en-US"/>
           </a:p>
@@ -1483,7 +1483,7 @@
           <a:p>
             <a:fld id="{276D79ED-3FA7-4EF8-964B-EB8BCFAB02F8}" type="datetimeFigureOut">
               <a:rPr lang="en-US" smtClean="0"/>
-              <a:t>7/18/2024</a:t>
+              <a:t>7/22/2024</a:t>
             </a:fld>
             <a:endParaRPr lang="en-US"/>
           </a:p>
@@ -1759,7 +1759,7 @@
           <a:p>
             <a:fld id="{276D79ED-3FA7-4EF8-964B-EB8BCFAB02F8}" type="datetimeFigureOut">
               <a:rPr lang="en-US" smtClean="0"/>
-              <a:t>7/18/2024</a:t>
+              <a:t>7/22/2024</a:t>
             </a:fld>
             <a:endParaRPr lang="en-US"/>
           </a:p>
@@ -2015,7 +2015,7 @@
           <a:p>
             <a:fld id="{276D79ED-3FA7-4EF8-964B-EB8BCFAB02F8}" type="datetimeFigureOut">
               <a:rPr lang="en-US" smtClean="0"/>
-              <a:t>7/18/2024</a:t>
+              <a:t>7/22/2024</a:t>
             </a:fld>
             <a:endParaRPr lang="en-US"/>
           </a:p>
@@ -2235,7 +2235,7 @@
           <a:p>
             <a:fld id="{276D79ED-3FA7-4EF8-964B-EB8BCFAB02F8}" type="datetimeFigureOut">
               <a:rPr lang="en-US" smtClean="0"/>
-              <a:t>7/18/2024</a:t>
+              <a:t>7/22/2024</a:t>
             </a:fld>
             <a:endParaRPr lang="en-US"/>
           </a:p>
@@ -3036,13 +3036,13 @@
   <p:clrMapOvr>
     <a:masterClrMapping/>
   </p:clrMapOvr>
-  <mc:AlternateContent xmlns:mc="http://schemas.openxmlformats.org/markup-compatibility/2006">
-    <mc:Choice xmlns:p159="http://schemas.microsoft.com/office/powerpoint/2015/09/main" Requires="p159">
+  <mc:AlternateContent xmlns:mc="http://schemas.openxmlformats.org/markup-compatibility/2006" xmlns:p159="http://schemas.microsoft.com/office/powerpoint/2015/09/main">
+    <mc:Choice Requires="p159">
       <p:transition xmlns:p14="http://schemas.microsoft.com/office/powerpoint/2010/main" spd="slow" p14:dur="2000">
         <p159:morph option="byObject"/>
       </p:transition>
     </mc:Choice>
-    <mc:Fallback>
+    <mc:Fallback xmlns="">
       <p:transition spd="slow">
         <p:fade/>
       </p:transition>
@@ -3747,13 +3747,13 @@
   <p:clrMapOvr>
     <a:masterClrMapping/>
   </p:clrMapOvr>
-  <mc:AlternateContent xmlns:mc="http://schemas.openxmlformats.org/markup-compatibility/2006">
-    <mc:Choice xmlns:p159="http://schemas.microsoft.com/office/powerpoint/2015/09/main" Requires="p159">
+  <mc:AlternateContent xmlns:mc="http://schemas.openxmlformats.org/markup-compatibility/2006" xmlns:p159="http://schemas.microsoft.com/office/powerpoint/2015/09/main">
+    <mc:Choice Requires="p159">
       <p:transition xmlns:p14="http://schemas.microsoft.com/office/powerpoint/2010/main" spd="slow" p14:dur="2000">
         <p159:morph option="byObject"/>
       </p:transition>
     </mc:Choice>
-    <mc:Fallback>
+    <mc:Fallback xmlns="">
       <p:transition spd="slow">
         <p:fade/>
       </p:transition>
@@ -3823,12 +3823,36 @@
               <a:t> </a:t>
             </a:r>
             <a:r>
+              <a:rPr lang="en-US" sz="1600" noProof="1">
+                <a:latin typeface="Calibri" panose="020F0502020204030204" pitchFamily="34" charset="0"/>
+                <a:ea typeface="Calibri" panose="020F0502020204030204" pitchFamily="34" charset="0"/>
+                <a:cs typeface="Times New Roman" panose="02020603050405020304" pitchFamily="18" charset="0"/>
+              </a:rPr>
+              <a:t>poate fi</a:t>
+            </a:r>
+            <a:r>
               <a:rPr lang="ro-RO" sz="1600" noProof="1">
                 <a:latin typeface="Calibri" panose="020F0502020204030204" pitchFamily="34" charset="0"/>
                 <a:ea typeface="Calibri" panose="020F0502020204030204" pitchFamily="34" charset="0"/>
                 <a:cs typeface="Times New Roman" panose="02020603050405020304" pitchFamily="18" charset="0"/>
               </a:rPr>
-              <a:t>îl puteți găsi </a:t>
+              <a:t> găsi</a:t>
+            </a:r>
+            <a:r>
+              <a:rPr lang="en-US" sz="1600" noProof="1">
+                <a:latin typeface="Calibri" panose="020F0502020204030204" pitchFamily="34" charset="0"/>
+                <a:ea typeface="Calibri" panose="020F0502020204030204" pitchFamily="34" charset="0"/>
+                <a:cs typeface="Times New Roman" panose="02020603050405020304" pitchFamily="18" charset="0"/>
+              </a:rPr>
+              <a:t>t</a:t>
+            </a:r>
+            <a:r>
+              <a:rPr lang="ro-RO" sz="1600" noProof="1">
+                <a:latin typeface="Calibri" panose="020F0502020204030204" pitchFamily="34" charset="0"/>
+                <a:ea typeface="Calibri" panose="020F0502020204030204" pitchFamily="34" charset="0"/>
+                <a:cs typeface="Times New Roman" panose="02020603050405020304" pitchFamily="18" charset="0"/>
+              </a:rPr>
+              <a:t> </a:t>
             </a:r>
             <a:endParaRPr lang="en-US" sz="1600" noProof="1">
               <a:latin typeface="Calibri" panose="020F0502020204030204" pitchFamily="34" charset="0"/>
@@ -4629,13 +4653,13 @@
   <p:clrMapOvr>
     <a:masterClrMapping/>
   </p:clrMapOvr>
-  <mc:AlternateContent xmlns:mc="http://schemas.openxmlformats.org/markup-compatibility/2006">
-    <mc:Choice xmlns:p159="http://schemas.microsoft.com/office/powerpoint/2015/09/main" Requires="p159">
+  <mc:AlternateContent xmlns:mc="http://schemas.openxmlformats.org/markup-compatibility/2006" xmlns:p159="http://schemas.microsoft.com/office/powerpoint/2015/09/main">
+    <mc:Choice Requires="p159">
       <p:transition xmlns:p14="http://schemas.microsoft.com/office/powerpoint/2010/main" spd="slow" p14:dur="2000">
         <p159:morph option="byObject"/>
       </p:transition>
     </mc:Choice>
-    <mc:Fallback>
+    <mc:Fallback xmlns="">
       <p:transition spd="slow">
         <p:fade/>
       </p:transition>
@@ -4982,13 +5006,13 @@
   <p:clrMapOvr>
     <a:masterClrMapping/>
   </p:clrMapOvr>
-  <mc:AlternateContent xmlns:mc="http://schemas.openxmlformats.org/markup-compatibility/2006">
-    <mc:Choice xmlns:p159="http://schemas.microsoft.com/office/powerpoint/2015/09/main" Requires="p159">
+  <mc:AlternateContent xmlns:mc="http://schemas.openxmlformats.org/markup-compatibility/2006" xmlns:p159="http://schemas.microsoft.com/office/powerpoint/2015/09/main">
+    <mc:Choice Requires="p159">
       <p:transition xmlns:p14="http://schemas.microsoft.com/office/powerpoint/2010/main" spd="slow" p14:dur="2000">
         <p159:morph option="byObject"/>
       </p:transition>
     </mc:Choice>
-    <mc:Fallback>
+    <mc:Fallback xmlns="">
       <p:transition spd="slow">
         <p:fade/>
       </p:transition>
@@ -5462,13 +5486,13 @@
   <p:clrMapOvr>
     <a:masterClrMapping/>
   </p:clrMapOvr>
-  <mc:AlternateContent xmlns:mc="http://schemas.openxmlformats.org/markup-compatibility/2006">
-    <mc:Choice xmlns:p159="http://schemas.microsoft.com/office/powerpoint/2015/09/main" Requires="p159">
+  <mc:AlternateContent xmlns:mc="http://schemas.openxmlformats.org/markup-compatibility/2006" xmlns:p159="http://schemas.microsoft.com/office/powerpoint/2015/09/main">
+    <mc:Choice Requires="p159">
       <p:transition xmlns:p14="http://schemas.microsoft.com/office/powerpoint/2010/main" spd="slow" p14:dur="2000">
         <p159:morph option="byObject"/>
       </p:transition>
     </mc:Choice>
-    <mc:Fallback>
+    <mc:Fallback xmlns="">
       <p:transition spd="slow">
         <p:fade/>
       </p:transition>
@@ -6129,13 +6153,13 @@
   <p:clrMapOvr>
     <a:masterClrMapping/>
   </p:clrMapOvr>
-  <mc:AlternateContent xmlns:mc="http://schemas.openxmlformats.org/markup-compatibility/2006">
-    <mc:Choice xmlns:p159="http://schemas.microsoft.com/office/powerpoint/2015/09/main" Requires="p159">
+  <mc:AlternateContent xmlns:mc="http://schemas.openxmlformats.org/markup-compatibility/2006" xmlns:p159="http://schemas.microsoft.com/office/powerpoint/2015/09/main">
+    <mc:Choice Requires="p159">
       <p:transition xmlns:p14="http://schemas.microsoft.com/office/powerpoint/2010/main" spd="slow" p14:dur="2000">
         <p159:morph option="byObject"/>
       </p:transition>
     </mc:Choice>
-    <mc:Fallback>
+    <mc:Fallback xmlns="">
       <p:transition spd="slow">
         <p:fade/>
       </p:transition>
@@ -8178,13 +8202,13 @@
   <p:clrMapOvr>
     <a:masterClrMapping/>
   </p:clrMapOvr>
-  <mc:AlternateContent xmlns:mc="http://schemas.openxmlformats.org/markup-compatibility/2006">
-    <mc:Choice xmlns:p159="http://schemas.microsoft.com/office/powerpoint/2015/09/main" Requires="p159">
+  <mc:AlternateContent xmlns:mc="http://schemas.openxmlformats.org/markup-compatibility/2006" xmlns:p159="http://schemas.microsoft.com/office/powerpoint/2015/09/main">
+    <mc:Choice Requires="p159">
       <p:transition xmlns:p14="http://schemas.microsoft.com/office/powerpoint/2010/main" spd="slow" p14:dur="2000">
         <p159:morph option="byObject"/>
       </p:transition>
     </mc:Choice>
-    <mc:Fallback>
+    <mc:Fallback xmlns="">
       <p:transition spd="slow">
         <p:fade/>
       </p:transition>
@@ -8397,13 +8421,13 @@
   <p:clrMapOvr>
     <a:masterClrMapping/>
   </p:clrMapOvr>
-  <mc:AlternateContent xmlns:mc="http://schemas.openxmlformats.org/markup-compatibility/2006">
-    <mc:Choice xmlns:p159="http://schemas.microsoft.com/office/powerpoint/2015/09/main" Requires="p159">
+  <mc:AlternateContent xmlns:mc="http://schemas.openxmlformats.org/markup-compatibility/2006" xmlns:p159="http://schemas.microsoft.com/office/powerpoint/2015/09/main">
+    <mc:Choice Requires="p159">
       <p:transition xmlns:p14="http://schemas.microsoft.com/office/powerpoint/2010/main" spd="slow" p14:dur="2000">
         <p159:morph option="byObject"/>
       </p:transition>
     </mc:Choice>
-    <mc:Fallback>
+    <mc:Fallback xmlns="">
       <p:transition spd="slow">
         <p:fade/>
       </p:transition>
@@ -9448,13 +9472,13 @@
   <p:clrMapOvr>
     <a:masterClrMapping/>
   </p:clrMapOvr>
-  <mc:AlternateContent xmlns:mc="http://schemas.openxmlformats.org/markup-compatibility/2006">
-    <mc:Choice xmlns:p159="http://schemas.microsoft.com/office/powerpoint/2015/09/main" Requires="p159">
+  <mc:AlternateContent xmlns:mc="http://schemas.openxmlformats.org/markup-compatibility/2006" xmlns:p159="http://schemas.microsoft.com/office/powerpoint/2015/09/main">
+    <mc:Choice Requires="p159">
       <p:transition xmlns:p14="http://schemas.microsoft.com/office/powerpoint/2010/main" spd="slow" p14:dur="2000">
         <p159:morph option="byObject"/>
       </p:transition>
     </mc:Choice>
-    <mc:Fallback>
+    <mc:Fallback xmlns="">
       <p:transition spd="slow">
         <p:fade/>
       </p:transition>
@@ -10234,13 +10258,13 @@
   <p:clrMapOvr>
     <a:masterClrMapping/>
   </p:clrMapOvr>
-  <mc:AlternateContent xmlns:mc="http://schemas.openxmlformats.org/markup-compatibility/2006">
-    <mc:Choice xmlns:p159="http://schemas.microsoft.com/office/powerpoint/2015/09/main" Requires="p159">
+  <mc:AlternateContent xmlns:mc="http://schemas.openxmlformats.org/markup-compatibility/2006" xmlns:p159="http://schemas.microsoft.com/office/powerpoint/2015/09/main">
+    <mc:Choice Requires="p159">
       <p:transition xmlns:p14="http://schemas.microsoft.com/office/powerpoint/2010/main" spd="slow" p14:dur="2000">
         <p159:morph option="byObject"/>
       </p:transition>
     </mc:Choice>
-    <mc:Fallback>
+    <mc:Fallback xmlns="">
       <p:transition spd="slow">
         <p:fade/>
       </p:transition>
@@ -11122,13 +11146,13 @@
   <p:clrMapOvr>
     <a:masterClrMapping/>
   </p:clrMapOvr>
-  <mc:AlternateContent xmlns:mc="http://schemas.openxmlformats.org/markup-compatibility/2006">
-    <mc:Choice xmlns:p159="http://schemas.microsoft.com/office/powerpoint/2015/09/main" Requires="p159">
+  <mc:AlternateContent xmlns:mc="http://schemas.openxmlformats.org/markup-compatibility/2006" xmlns:p159="http://schemas.microsoft.com/office/powerpoint/2015/09/main">
+    <mc:Choice Requires="p159">
       <p:transition xmlns:p14="http://schemas.microsoft.com/office/powerpoint/2010/main" spd="slow" p14:dur="2000">
         <p159:morph option="byObject"/>
       </p:transition>
     </mc:Choice>
-    <mc:Fallback>
+    <mc:Fallback xmlns="">
       <p:transition spd="slow">
         <p:fade/>
       </p:transition>
@@ -11682,13 +11706,13 @@
   <p:clrMapOvr>
     <a:masterClrMapping/>
   </p:clrMapOvr>
-  <mc:AlternateContent xmlns:mc="http://schemas.openxmlformats.org/markup-compatibility/2006">
-    <mc:Choice xmlns:p159="http://schemas.microsoft.com/office/powerpoint/2015/09/main" Requires="p159">
+  <mc:AlternateContent xmlns:mc="http://schemas.openxmlformats.org/markup-compatibility/2006" xmlns:p159="http://schemas.microsoft.com/office/powerpoint/2015/09/main">
+    <mc:Choice Requires="p159">
       <p:transition xmlns:p14="http://schemas.microsoft.com/office/powerpoint/2010/main" spd="slow" p14:dur="2000">
         <p159:morph option="byObject"/>
       </p:transition>
     </mc:Choice>
-    <mc:Fallback>
+    <mc:Fallback xmlns="">
       <p:transition spd="slow">
         <p:fade/>
       </p:transition>
@@ -12398,13 +12422,13 @@
   <p:clrMapOvr>
     <a:masterClrMapping/>
   </p:clrMapOvr>
-  <mc:AlternateContent xmlns:mc="http://schemas.openxmlformats.org/markup-compatibility/2006">
-    <mc:Choice xmlns:p159="http://schemas.microsoft.com/office/powerpoint/2015/09/main" Requires="p159">
+  <mc:AlternateContent xmlns:mc="http://schemas.openxmlformats.org/markup-compatibility/2006" xmlns:p159="http://schemas.microsoft.com/office/powerpoint/2015/09/main">
+    <mc:Choice Requires="p159">
       <p:transition xmlns:p14="http://schemas.microsoft.com/office/powerpoint/2010/main" spd="slow" p14:dur="2000">
         <p159:morph option="byObject"/>
       </p:transition>
     </mc:Choice>
-    <mc:Fallback>
+    <mc:Fallback xmlns="">
       <p:transition spd="slow">
         <p:fade/>
       </p:transition>
@@ -13134,13 +13158,13 @@
   <p:clrMapOvr>
     <a:masterClrMapping/>
   </p:clrMapOvr>
-  <mc:AlternateContent xmlns:mc="http://schemas.openxmlformats.org/markup-compatibility/2006">
-    <mc:Choice xmlns:p159="http://schemas.microsoft.com/office/powerpoint/2015/09/main" Requires="p159">
+  <mc:AlternateContent xmlns:mc="http://schemas.openxmlformats.org/markup-compatibility/2006" xmlns:p159="http://schemas.microsoft.com/office/powerpoint/2015/09/main">
+    <mc:Choice Requires="p159">
       <p:transition xmlns:p14="http://schemas.microsoft.com/office/powerpoint/2010/main" spd="slow" p14:dur="2000">
         <p159:morph option="byObject"/>
       </p:transition>
     </mc:Choice>
-    <mc:Fallback>
+    <mc:Fallback xmlns="">
       <p:transition spd="slow">
         <p:fade/>
       </p:transition>
@@ -13316,13 +13340,13 @@
   <p:clrMapOvr>
     <a:masterClrMapping/>
   </p:clrMapOvr>
-  <mc:AlternateContent xmlns:mc="http://schemas.openxmlformats.org/markup-compatibility/2006">
-    <mc:Choice xmlns:p159="http://schemas.microsoft.com/office/powerpoint/2015/09/main" Requires="p159">
+  <mc:AlternateContent xmlns:mc="http://schemas.openxmlformats.org/markup-compatibility/2006" xmlns:p159="http://schemas.microsoft.com/office/powerpoint/2015/09/main">
+    <mc:Choice Requires="p159">
       <p:transition xmlns:p14="http://schemas.microsoft.com/office/powerpoint/2010/main" spd="slow" p14:dur="2000">
         <p159:morph option="byObject"/>
       </p:transition>
     </mc:Choice>
-    <mc:Fallback>
+    <mc:Fallback xmlns="">
       <p:transition spd="slow">
         <p:fade/>
       </p:transition>
@@ -14150,13 +14174,13 @@
   <p:clrMapOvr>
     <a:masterClrMapping/>
   </p:clrMapOvr>
-  <mc:AlternateContent xmlns:mc="http://schemas.openxmlformats.org/markup-compatibility/2006">
-    <mc:Choice xmlns:p159="http://schemas.microsoft.com/office/powerpoint/2015/09/main" Requires="p159">
+  <mc:AlternateContent xmlns:mc="http://schemas.openxmlformats.org/markup-compatibility/2006" xmlns:p159="http://schemas.microsoft.com/office/powerpoint/2015/09/main">
+    <mc:Choice Requires="p159">
       <p:transition xmlns:p14="http://schemas.microsoft.com/office/powerpoint/2010/main" spd="slow" p14:dur="2000">
         <p159:morph option="byObject"/>
       </p:transition>
     </mc:Choice>
-    <mc:Fallback>
+    <mc:Fallback xmlns="">
       <p:transition spd="slow">
         <p:fade/>
       </p:transition>

</xml_diff>